<commit_message>
edits to the powerpoint
</commit_message>
<xml_diff>
--- a/ZoomInfo_casestudy.pptx
+++ b/ZoomInfo_casestudy.pptx
@@ -108,6 +108,11 @@
       </a:defRPr>
     </a:lvl9pPr>
   </p:defaultTextStyle>
+  <p:extLst>
+    <p:ext uri="{EFAFB233-063F-42B5-8137-9DF3F51BA10A}">
+      <p15:sldGuideLst xmlns:p15="http://schemas.microsoft.com/office/powerpoint/2012/main"/>
+    </p:ext>
+  </p:extLst>
 </p:presentation>
 </file>
 
@@ -3434,7 +3439,7 @@
           <a:p>
             <a:r>
               <a:rPr lang="en-US" dirty="0"/>
-              <a:t>Question: Does the research yield better results than the vendor data?</a:t>
+              <a:t>Question: Should ZoomInfo purchase the vendor data?</a:t>
             </a:r>
           </a:p>
         </p:txBody>
@@ -3582,7 +3587,7 @@
           <a:p>
             <a:r>
               <a:rPr lang="en-US" dirty="0"/>
-              <a:t>Question: Does the research yield better results than the vendor data?</a:t>
+              <a:t>Question: Should ZoomInfo purchase the vendor data?</a:t>
             </a:r>
           </a:p>
         </p:txBody>
@@ -3629,7 +3634,7 @@
             <a:pPr lvl="1"/>
             <a:r>
               <a:rPr lang="en-US" dirty="0"/>
-              <a:t>Look at the comments to see the process</a:t>
+              <a:t>The comments detail the process</a:t>
             </a:r>
           </a:p>
         </p:txBody>

</xml_diff>